<commit_message>
updated class format slides
</commit_message>
<xml_diff>
--- a/helpsessions/week1/format.pptx
+++ b/helpsessions/week1/format.pptx
@@ -5,10 +5,10 @@
     <p:sldMasterId id="2147483648" r:id="rId1"/>
   </p:sldMasterIdLst>
   <p:notesMasterIdLst>
-    <p:notesMasterId r:id="rId13"/>
+    <p:notesMasterId r:id="rId11"/>
   </p:notesMasterIdLst>
   <p:handoutMasterIdLst>
-    <p:handoutMasterId r:id="rId14"/>
+    <p:handoutMasterId r:id="rId12"/>
   </p:handoutMasterIdLst>
   <p:sldIdLst>
     <p:sldId id="256" r:id="rId2"/>
@@ -18,10 +18,8 @@
     <p:sldId id="263" r:id="rId6"/>
     <p:sldId id="264" r:id="rId7"/>
     <p:sldId id="265" r:id="rId8"/>
-    <p:sldId id="266" r:id="rId9"/>
-    <p:sldId id="262" r:id="rId10"/>
-    <p:sldId id="267" r:id="rId11"/>
-    <p:sldId id="259" r:id="rId12"/>
+    <p:sldId id="262" r:id="rId9"/>
+    <p:sldId id="259" r:id="rId10"/>
   </p:sldIdLst>
   <p:sldSz cx="13817600" cy="7772400"/>
   <p:notesSz cx="6858000" cy="9144000"/>
@@ -224,7 +222,7 @@
           <a:p>
             <a:fld id="{4D7E51A5-B478-1E40-8CBB-0DAA8831E99D}" type="datetimeFigureOut">
               <a:rPr lang="en-US" smtClean="0"/>
-              <a:t>8/24/20</a:t>
+              <a:t>1/18/21</a:t>
             </a:fld>
             <a:endParaRPr lang="en-US"/>
           </a:p>
@@ -389,7 +387,7 @@
           <a:p>
             <a:fld id="{D0ED587F-861E-6740-9643-E3DDAE89B8D6}" type="datetimeFigureOut">
               <a:rPr lang="en-US" smtClean="0"/>
-              <a:t>8/24/20</a:t>
+              <a:t>1/18/21</a:t>
             </a:fld>
             <a:endParaRPr lang="en-US"/>
           </a:p>
@@ -6718,350 +6716,6 @@
 </p:sld>
 </file>
 
-<file path=ppt/slides/slide10.xml><?xml version="1.0" encoding="utf-8"?>
-<p:sld xmlns:a="http://schemas.openxmlformats.org/drawingml/2006/main" xmlns:r="http://schemas.openxmlformats.org/officeDocument/2006/relationships" xmlns:p="http://schemas.openxmlformats.org/presentationml/2006/main">
-  <p:cSld>
-    <p:spTree>
-      <p:nvGrpSpPr>
-        <p:cNvPr id="1" name=""/>
-        <p:cNvGrpSpPr/>
-        <p:nvPr/>
-      </p:nvGrpSpPr>
-      <p:grpSpPr>
-        <a:xfrm>
-          <a:off x="0" y="0"/>
-          <a:ext cx="0" cy="0"/>
-          <a:chOff x="0" y="0"/>
-          <a:chExt cx="0" cy="0"/>
-        </a:xfrm>
-      </p:grpSpPr>
-      <p:sp>
-        <p:nvSpPr>
-          <p:cNvPr id="2" name="Title 1">
-            <a:extLst>
-              <a:ext uri="{FF2B5EF4-FFF2-40B4-BE49-F238E27FC236}">
-                <a16:creationId xmlns:a16="http://schemas.microsoft.com/office/drawing/2014/main" id="{0CD8928F-A8B0-0742-B52A-54677ED7F2D4}"/>
-              </a:ext>
-            </a:extLst>
-          </p:cNvPr>
-          <p:cNvSpPr>
-            <a:spLocks noGrp="1"/>
-          </p:cNvSpPr>
-          <p:nvPr>
-            <p:ph type="title"/>
-          </p:nvPr>
-        </p:nvSpPr>
-        <p:spPr/>
-        <p:txBody>
-          <a:bodyPr/>
-          <a:lstStyle/>
-          <a:p>
-            <a:r>
-              <a:rPr lang="en-US" dirty="0"/>
-              <a:t>COVID – and being sick</a:t>
-            </a:r>
-          </a:p>
-        </p:txBody>
-      </p:sp>
-      <p:sp>
-        <p:nvSpPr>
-          <p:cNvPr id="3" name="Text Placeholder 2">
-            <a:extLst>
-              <a:ext uri="{FF2B5EF4-FFF2-40B4-BE49-F238E27FC236}">
-                <a16:creationId xmlns:a16="http://schemas.microsoft.com/office/drawing/2014/main" id="{0CB79C01-DBC2-CF4D-B0F9-54AB036C10A6}"/>
-              </a:ext>
-            </a:extLst>
-          </p:cNvPr>
-          <p:cNvSpPr>
-            <a:spLocks noGrp="1"/>
-          </p:cNvSpPr>
-          <p:nvPr>
-            <p:ph type="body" sz="quarter" idx="10"/>
-          </p:nvPr>
-        </p:nvSpPr>
-        <p:spPr>
-          <a:xfrm>
-            <a:off x="628075" y="1776683"/>
-            <a:ext cx="12561453" cy="4923464"/>
-          </a:xfrm>
-        </p:spPr>
-        <p:txBody>
-          <a:bodyPr/>
-          <a:lstStyle/>
-          <a:p>
-            <a:r>
-              <a:rPr lang="en-US" dirty="0"/>
-              <a:t>If the symptom checker says “don’t come to campus”</a:t>
-            </a:r>
-          </a:p>
-          <a:p>
-            <a:pPr lvl="1"/>
-            <a:r>
-              <a:rPr lang="en-US" dirty="0"/>
-              <a:t>Then don’t come to campus</a:t>
-            </a:r>
-          </a:p>
-          <a:p>
-            <a:r>
-              <a:rPr lang="en-US" dirty="0"/>
-              <a:t>Everything is performance based</a:t>
-            </a:r>
-          </a:p>
-          <a:p>
-            <a:pPr lvl="1"/>
-            <a:r>
-              <a:rPr lang="en-US" dirty="0"/>
-              <a:t>Which means we only take attendance for extra credit. </a:t>
-            </a:r>
-          </a:p>
-          <a:p>
-            <a:r>
-              <a:rPr lang="en-US" dirty="0"/>
-              <a:t>As long as you get it done, you are fine. </a:t>
-            </a:r>
-          </a:p>
-          <a:p>
-            <a:pPr lvl="1"/>
-            <a:r>
-              <a:rPr lang="en-US" dirty="0"/>
-              <a:t>If you are unable to work, please work with case management! </a:t>
-            </a:r>
-          </a:p>
-          <a:p>
-            <a:pPr lvl="1"/>
-            <a:endParaRPr lang="en-US" dirty="0"/>
-          </a:p>
-          <a:p>
-            <a:pPr lvl="1"/>
-            <a:endParaRPr lang="en-US" dirty="0"/>
-          </a:p>
-          <a:p>
-            <a:pPr lvl="1"/>
-            <a:endParaRPr lang="en-US" dirty="0"/>
-          </a:p>
-          <a:p>
-            <a:r>
-              <a:rPr lang="en-US" dirty="0"/>
-              <a:t>Extra Credit</a:t>
-            </a:r>
-          </a:p>
-          <a:p>
-            <a:pPr lvl="1"/>
-            <a:r>
-              <a:rPr lang="en-US" dirty="0"/>
-              <a:t>You have enough for an entire letter grade (maxes at 100 points)</a:t>
-            </a:r>
-          </a:p>
-          <a:p>
-            <a:pPr lvl="1"/>
-            <a:r>
-              <a:rPr lang="en-US" dirty="0"/>
-              <a:t>You should do it!</a:t>
-            </a:r>
-          </a:p>
-        </p:txBody>
-      </p:sp>
-    </p:spTree>
-    <p:extLst>
-      <p:ext uri="{BB962C8B-B14F-4D97-AF65-F5344CB8AC3E}">
-        <p14:creationId xmlns:p14="http://schemas.microsoft.com/office/powerpoint/2010/main" val="2179074780"/>
-      </p:ext>
-    </p:extLst>
-  </p:cSld>
-  <p:clrMapOvr>
-    <a:masterClrMapping/>
-  </p:clrMapOvr>
-  <mc:AlternateContent xmlns:mc="http://schemas.openxmlformats.org/markup-compatibility/2006" xmlns:p14="http://schemas.microsoft.com/office/powerpoint/2010/main">
-    <mc:Choice Requires="p14">
-      <p:transition p14:dur="300">
-        <p:fade/>
-      </p:transition>
-    </mc:Choice>
-    <mc:Fallback xmlns="">
-      <p:transition>
-        <p:fade/>
-      </p:transition>
-    </mc:Fallback>
-  </mc:AlternateContent>
-</p:sld>
-</file>
-
-<file path=ppt/slides/slide11.xml><?xml version="1.0" encoding="utf-8"?>
-<p:sld xmlns:a="http://schemas.openxmlformats.org/drawingml/2006/main" xmlns:r="http://schemas.openxmlformats.org/officeDocument/2006/relationships" xmlns:p="http://schemas.openxmlformats.org/presentationml/2006/main">
-  <p:cSld>
-    <p:spTree>
-      <p:nvGrpSpPr>
-        <p:cNvPr id="1" name=""/>
-        <p:cNvGrpSpPr/>
-        <p:nvPr/>
-      </p:nvGrpSpPr>
-      <p:grpSpPr>
-        <a:xfrm>
-          <a:off x="0" y="0"/>
-          <a:ext cx="0" cy="0"/>
-          <a:chOff x="0" y="0"/>
-          <a:chExt cx="0" cy="0"/>
-        </a:xfrm>
-      </p:grpSpPr>
-      <p:sp>
-        <p:nvSpPr>
-          <p:cNvPr id="2" name="Title 1">
-            <a:extLst>
-              <a:ext uri="{FF2B5EF4-FFF2-40B4-BE49-F238E27FC236}">
-                <a16:creationId xmlns:a16="http://schemas.microsoft.com/office/drawing/2014/main" id="{6302E6FC-80C8-2F4C-A9F0-9B205434775A}"/>
-              </a:ext>
-            </a:extLst>
-          </p:cNvPr>
-          <p:cNvSpPr>
-            <a:spLocks noGrp="1"/>
-          </p:cNvSpPr>
-          <p:nvPr>
-            <p:ph type="title"/>
-          </p:nvPr>
-        </p:nvSpPr>
-        <p:spPr/>
-        <p:txBody>
-          <a:bodyPr/>
-          <a:lstStyle/>
-          <a:p>
-            <a:r>
-              <a:rPr lang="en-US" dirty="0"/>
-              <a:t>Coding is Like Music</a:t>
-            </a:r>
-          </a:p>
-        </p:txBody>
-      </p:sp>
-      <p:sp>
-        <p:nvSpPr>
-          <p:cNvPr id="3" name="Text Placeholder 2">
-            <a:extLst>
-              <a:ext uri="{FF2B5EF4-FFF2-40B4-BE49-F238E27FC236}">
-                <a16:creationId xmlns:a16="http://schemas.microsoft.com/office/drawing/2014/main" id="{93E01694-2C32-BA4D-B6F8-4BE99716E841}"/>
-              </a:ext>
-            </a:extLst>
-          </p:cNvPr>
-          <p:cNvSpPr>
-            <a:spLocks noGrp="1"/>
-          </p:cNvSpPr>
-          <p:nvPr>
-            <p:ph type="body" sz="quarter" idx="10"/>
-          </p:nvPr>
-        </p:nvSpPr>
-        <p:spPr>
-          <a:xfrm>
-            <a:off x="628075" y="1776683"/>
-            <a:ext cx="12561453" cy="4323299"/>
-          </a:xfrm>
-        </p:spPr>
-        <p:txBody>
-          <a:bodyPr/>
-          <a:lstStyle/>
-          <a:p>
-            <a:r>
-              <a:rPr lang="en-US" dirty="0"/>
-              <a:t>To be successful in CS 150</a:t>
-            </a:r>
-          </a:p>
-          <a:p>
-            <a:pPr lvl="1"/>
-            <a:r>
-              <a:rPr lang="en-US" dirty="0"/>
-              <a:t>Work ahead of the schedule</a:t>
-            </a:r>
-          </a:p>
-          <a:p>
-            <a:pPr lvl="2"/>
-            <a:r>
-              <a:rPr lang="en-US" dirty="0"/>
-              <a:t>Go through the modules</a:t>
-            </a:r>
-          </a:p>
-          <a:p>
-            <a:pPr lvl="2"/>
-            <a:r>
-              <a:rPr lang="en-US" dirty="0"/>
-              <a:t>Try the lab before going to the lab day! </a:t>
-            </a:r>
-          </a:p>
-          <a:p>
-            <a:pPr lvl="1"/>
-            <a:r>
-              <a:rPr lang="en-US" dirty="0"/>
-              <a:t>Practice often (daily)</a:t>
-            </a:r>
-          </a:p>
-          <a:p>
-            <a:pPr lvl="1"/>
-            <a:r>
-              <a:rPr lang="en-US" dirty="0"/>
-              <a:t>Get help when you are stuck</a:t>
-            </a:r>
-          </a:p>
-          <a:p>
-            <a:pPr lvl="1"/>
-            <a:r>
-              <a:rPr lang="en-US" dirty="0"/>
-              <a:t>Keep practicing</a:t>
-            </a:r>
-          </a:p>
-          <a:p>
-            <a:r>
-              <a:rPr lang="en-US" dirty="0"/>
-              <a:t>Memorization</a:t>
-            </a:r>
-          </a:p>
-          <a:p>
-            <a:pPr lvl="1"/>
-            <a:r>
-              <a:rPr lang="en-US" dirty="0"/>
-              <a:t>Won’t help you! (maybe on culture topics)</a:t>
-            </a:r>
-          </a:p>
-          <a:p>
-            <a:pPr lvl="1"/>
-            <a:r>
-              <a:rPr lang="en-US" dirty="0"/>
-              <a:t>You can’t memorize problem solving</a:t>
-            </a:r>
-          </a:p>
-          <a:p>
-            <a:pPr lvl="2"/>
-            <a:r>
-              <a:rPr lang="en-US" dirty="0"/>
-              <a:t>You have to practice </a:t>
-            </a:r>
-            <a:r>
-              <a:rPr lang="en-US" b="1" dirty="0"/>
-              <a:t>Divide-Conquer-Glue</a:t>
-            </a:r>
-          </a:p>
-        </p:txBody>
-      </p:sp>
-    </p:spTree>
-    <p:extLst>
-      <p:ext uri="{BB962C8B-B14F-4D97-AF65-F5344CB8AC3E}">
-        <p14:creationId xmlns:p14="http://schemas.microsoft.com/office/powerpoint/2010/main" val="2945212090"/>
-      </p:ext>
-    </p:extLst>
-  </p:cSld>
-  <p:clrMapOvr>
-    <a:masterClrMapping/>
-  </p:clrMapOvr>
-  <mc:AlternateContent xmlns:mc="http://schemas.openxmlformats.org/markup-compatibility/2006" xmlns:p14="http://schemas.microsoft.com/office/powerpoint/2010/main">
-    <mc:Choice Requires="p14">
-      <p:transition p14:dur="300">
-        <p:fade/>
-      </p:transition>
-    </mc:Choice>
-    <mc:Fallback xmlns="">
-      <p:transition>
-        <p:fade/>
-      </p:transition>
-    </mc:Fallback>
-  </mc:AlternateContent>
-</p:sld>
-</file>
-
 <file path=ppt/slides/slide2.xml><?xml version="1.0" encoding="utf-8"?>
 <p:sld xmlns:a="http://schemas.openxmlformats.org/drawingml/2006/main" xmlns:r="http://schemas.openxmlformats.org/officeDocument/2006/relationships" xmlns:p="http://schemas.openxmlformats.org/presentationml/2006/main">
   <p:cSld>
@@ -7126,7 +6780,7 @@
         <p:spPr>
           <a:xfrm>
             <a:off x="628075" y="1776683"/>
-            <a:ext cx="12561453" cy="3692357"/>
+            <a:ext cx="12561453" cy="4064767"/>
           </a:xfrm>
         </p:spPr>
         <p:txBody>
@@ -7135,14 +6789,21 @@
           <a:p>
             <a:r>
               <a:rPr lang="en-US" dirty="0"/>
-              <a:t>Introduce yourself to the people around you </a:t>
+              <a:t>Introduce yourself</a:t>
             </a:r>
           </a:p>
           <a:p>
             <a:pPr lvl="1"/>
             <a:r>
               <a:rPr lang="en-US" dirty="0"/>
-              <a:t>smaller rooms, we can do this for everyone</a:t>
+              <a:t>Popcorn style</a:t>
+            </a:r>
+          </a:p>
+          <a:p>
+            <a:pPr lvl="1"/>
+            <a:r>
+              <a:rPr lang="en-US" dirty="0"/>
+              <a:t>Please have cameras on</a:t>
             </a:r>
           </a:p>
           <a:p>
@@ -7168,7 +6829,7 @@
             <a:pPr lvl="1"/>
             <a:r>
               <a:rPr lang="en-US" dirty="0"/>
-              <a:t>This help session is your cohort</a:t>
+              <a:t>This group (called help session) is your cohort</a:t>
             </a:r>
           </a:p>
           <a:p>
@@ -7667,56 +7328,56 @@
             <a:pPr lvl="1"/>
             <a:r>
               <a:rPr lang="en-US" dirty="0"/>
-              <a:t>Practice Exams</a:t>
+              <a:t>Readings</a:t>
             </a:r>
           </a:p>
           <a:p>
             <a:pPr lvl="2"/>
             <a:r>
               <a:rPr lang="en-US" dirty="0"/>
-              <a:t>Resubmit all semester</a:t>
+              <a:t>Resubmit until the Unit Exam / End of the Unit</a:t>
             </a:r>
           </a:p>
           <a:p>
             <a:pPr lvl="1"/>
             <a:r>
               <a:rPr lang="en-US" dirty="0"/>
-              <a:t>Readings</a:t>
+              <a:t>Labs</a:t>
             </a:r>
           </a:p>
           <a:p>
             <a:pPr lvl="2"/>
             <a:r>
               <a:rPr lang="en-US" dirty="0"/>
-              <a:t>Resubmit until the Unit Exam / End of the Unit</a:t>
+              <a:t>Resubmit up to a certain number of times until Unit Exam / End of The Unit</a:t>
             </a:r>
           </a:p>
           <a:p>
             <a:pPr lvl="1"/>
             <a:r>
               <a:rPr lang="en-US" dirty="0"/>
-              <a:t>Labs</a:t>
+              <a:t>Written Assignments</a:t>
             </a:r>
           </a:p>
           <a:p>
             <a:pPr lvl="2"/>
             <a:r>
               <a:rPr lang="en-US" dirty="0"/>
-              <a:t>Resubmit up to a certain number of times until Unit Exam / End of The Unit</a:t>
+              <a:t>Single submission, due Thursday  nights with Sunday accommodation window</a:t>
             </a:r>
           </a:p>
           <a:p>
             <a:pPr lvl="1"/>
             <a:r>
               <a:rPr lang="en-US" dirty="0"/>
-              <a:t>Written Assignments</a:t>
+              <a:t>Take Home Exams</a:t>
             </a:r>
           </a:p>
           <a:p>
             <a:pPr lvl="2"/>
             <a:r>
               <a:rPr lang="en-US" dirty="0"/>
-              <a:t>Single submission</a:t>
+              <a:t>Single submission, due Thursday  nights with Sunday accommodation window </a:t>
             </a:r>
           </a:p>
           <a:p>
@@ -7729,7 +7390,7 @@
           <a:p>
             <a:pPr lvl="1"/>
             <a:r>
-              <a:rPr lang="en-US" dirty="0"/>
+              <a:rPr lang="en-US" u="sng" dirty="0"/>
               <a:t>Make sure by the end of each week, you have completed the module except for the last lab (that is due the next Monday)</a:t>
             </a:r>
           </a:p>
@@ -7838,7 +7499,7 @@
         <p:spPr>
           <a:xfrm>
             <a:off x="628075" y="1776683"/>
-            <a:ext cx="12561453" cy="2312621"/>
+            <a:ext cx="12561453" cy="2685030"/>
           </a:xfrm>
         </p:spPr>
         <p:txBody>
@@ -7864,14 +7525,21 @@
           <a:p>
             <a:pPr lvl="1"/>
             <a:r>
-              <a:rPr lang="en-US" dirty="0"/>
+              <a:rPr lang="en-US" b="1" dirty="0"/>
               <a:t>Do reading before lab! </a:t>
             </a:r>
           </a:p>
           <a:p>
             <a:r>
-              <a:rPr lang="en-US" dirty="0"/>
+              <a:rPr lang="en-US" i="1" dirty="0"/>
               <a:t>First reading is the longest by far! </a:t>
+            </a:r>
+          </a:p>
+          <a:p>
+            <a:pPr lvl="1"/>
+            <a:r>
+              <a:rPr lang="en-US" dirty="0"/>
+              <a:t>Don’t Panic!</a:t>
             </a:r>
           </a:p>
           <a:p>
@@ -7947,7 +7615,7 @@
           <a:p>
             <a:r>
               <a:rPr lang="en-US" dirty="0"/>
-              <a:t>Knowledge Checks</a:t>
+              <a:t>Knowledge Checks &amp; Exams</a:t>
             </a:r>
           </a:p>
         </p:txBody>
@@ -7971,7 +7639,7 @@
         <p:spPr>
           <a:xfrm>
             <a:off x="628076" y="1776683"/>
-            <a:ext cx="8381014" cy="4437112"/>
+            <a:ext cx="8381014" cy="5405775"/>
           </a:xfrm>
         </p:spPr>
         <p:txBody>
@@ -8024,14 +7692,14 @@
           <a:p>
             <a:r>
               <a:rPr lang="en-US" dirty="0"/>
-              <a:t>Best way to study for exams?</a:t>
+              <a:t>Best way to study?</a:t>
             </a:r>
           </a:p>
           <a:p>
             <a:pPr lvl="1"/>
             <a:r>
               <a:rPr lang="en-US" dirty="0"/>
-              <a:t>Every night – knowledge checks, practice exam</a:t>
+              <a:t>Every night – knowledge checks</a:t>
             </a:r>
           </a:p>
           <a:p>
@@ -8053,6 +7721,19 @@
             <a:r>
               <a:rPr lang="en-US" dirty="0"/>
               <a:t>Highest result is the one kept</a:t>
+            </a:r>
+          </a:p>
+          <a:p>
+            <a:r>
+              <a:rPr lang="en-US" dirty="0"/>
+              <a:t>Exams</a:t>
+            </a:r>
+          </a:p>
+          <a:p>
+            <a:pPr lvl="1"/>
+            <a:r>
+              <a:rPr lang="en-US" dirty="0"/>
+              <a:t>Take Home! – One submission knowledge check essentially</a:t>
             </a:r>
           </a:p>
         </p:txBody>
@@ -8553,8 +8234,8 @@
         </p:nvSpPr>
         <p:spPr>
           <a:xfrm>
-            <a:off x="628075" y="1776683"/>
-            <a:ext cx="12561453" cy="3806170"/>
+            <a:off x="628075" y="1463722"/>
+            <a:ext cx="12561453" cy="5151154"/>
           </a:xfrm>
         </p:spPr>
         <p:txBody>
@@ -8569,47 +8250,67 @@
           <a:p>
             <a:r>
               <a:rPr lang="en-US" dirty="0"/>
-              <a:t>75 points – Do or don’t assignments  ~7% of your grade</a:t>
+              <a:t>Unit  1 and 3 shorter written assignments</a:t>
             </a:r>
           </a:p>
           <a:p>
             <a:pPr lvl="1"/>
             <a:r>
               <a:rPr lang="en-US" dirty="0"/>
-              <a:t>Discussion posts + reflection</a:t>
+              <a:t>50 points each </a:t>
             </a:r>
           </a:p>
           <a:p>
             <a:pPr lvl="1"/>
             <a:r>
               <a:rPr lang="en-US" dirty="0"/>
-              <a:t>Take your time. I read them all, and a single sentence will earn you a zero! </a:t>
-            </a:r>
-          </a:p>
-          <a:p>
-            <a:r>
-              <a:rPr lang="en-US" dirty="0"/>
-              <a:t>100 points – Midterm Essay –10% of your grade!</a:t>
+              <a:t>Graded by TAs </a:t>
             </a:r>
           </a:p>
           <a:p>
             <a:pPr lvl="1"/>
             <a:r>
               <a:rPr lang="en-US" dirty="0"/>
-              <a:t>Graded by TAs</a:t>
+              <a:t>Due Thursday of week 3 of the unit. </a:t>
+            </a:r>
+          </a:p>
+          <a:p>
+            <a:r>
+              <a:rPr lang="en-US" dirty="0"/>
+              <a:t>Unit 4 </a:t>
             </a:r>
           </a:p>
           <a:p>
             <a:pPr lvl="1"/>
             <a:r>
               <a:rPr lang="en-US" dirty="0"/>
+              <a:t>Course reflection – easy 50 points, as long as you do it! </a:t>
+            </a:r>
+          </a:p>
+          <a:p>
+            <a:r>
+              <a:rPr lang="en-US" dirty="0"/>
+              <a:t>Midterm Essay (Unit 2)</a:t>
+            </a:r>
+          </a:p>
+          <a:p>
+            <a:pPr lvl="1"/>
+            <a:r>
+              <a:rPr lang="en-US" dirty="0"/>
+              <a:t>100 points! </a:t>
+            </a:r>
+          </a:p>
+          <a:p>
+            <a:pPr lvl="1"/>
+            <a:r>
+              <a:rPr lang="en-US" dirty="0"/>
               <a:t>*major* component of your grade</a:t>
             </a:r>
           </a:p>
           <a:p>
             <a:r>
               <a:rPr lang="en-US" dirty="0"/>
-              <a:t>Practical Project - 8% of your grade</a:t>
+              <a:t>Practical Project - 8% of your grade (Unit 4 major project)</a:t>
             </a:r>
           </a:p>
           <a:p>
@@ -8617,6 +8318,91 @@
             <a:r>
               <a:rPr lang="en-US" dirty="0"/>
               <a:t>End of term project – 100 points graded paper, 50 points code. </a:t>
+            </a:r>
+          </a:p>
+        </p:txBody>
+      </p:sp>
+      <p:sp>
+        <p:nvSpPr>
+          <p:cNvPr id="4" name="TextBox 3">
+            <a:extLst>
+              <a:ext uri="{FF2B5EF4-FFF2-40B4-BE49-F238E27FC236}">
+                <a16:creationId xmlns:a16="http://schemas.microsoft.com/office/drawing/2014/main" id="{EBDC113C-D92D-2240-9D0F-DCDB8640F223}"/>
+              </a:ext>
+            </a:extLst>
+          </p:cNvPr>
+          <p:cNvSpPr txBox="1"/>
+          <p:nvPr/>
+        </p:nvSpPr>
+        <p:spPr>
+          <a:xfrm>
+            <a:off x="2336748" y="6614876"/>
+            <a:ext cx="7916141" cy="707886"/>
+          </a:xfrm>
+          <a:prstGeom prst="rect">
+            <a:avLst/>
+          </a:prstGeom>
+          <a:noFill/>
+        </p:spPr>
+        <p:txBody>
+          <a:bodyPr wrap="none" rtlCol="0">
+            <a:spAutoFit/>
+          </a:bodyPr>
+          <a:lstStyle/>
+          <a:p>
+            <a:pPr algn="ctr"/>
+            <a:r>
+              <a:rPr lang="en-US" dirty="0"/>
+              <a:t>Note: Week 4,8,12  – No Lecture/Help Sessions – Limited Help Desk</a:t>
+            </a:r>
+          </a:p>
+          <a:p>
+            <a:pPr algn="ctr"/>
+            <a:r>
+              <a:rPr lang="en-US" dirty="0"/>
+              <a:t>Gives time for TAs to grade!</a:t>
+            </a:r>
+          </a:p>
+        </p:txBody>
+      </p:sp>
+      <p:sp>
+        <p:nvSpPr>
+          <p:cNvPr id="5" name="TextBox 4">
+            <a:extLst>
+              <a:ext uri="{FF2B5EF4-FFF2-40B4-BE49-F238E27FC236}">
+                <a16:creationId xmlns:a16="http://schemas.microsoft.com/office/drawing/2014/main" id="{4AE290BE-E35A-344E-9229-DDAE460F1CEF}"/>
+              </a:ext>
+            </a:extLst>
+          </p:cNvPr>
+          <p:cNvSpPr txBox="1"/>
+          <p:nvPr/>
+        </p:nvSpPr>
+        <p:spPr>
+          <a:xfrm rot="694762">
+            <a:off x="9418320" y="1152960"/>
+            <a:ext cx="4028667" cy="707886"/>
+          </a:xfrm>
+          <a:prstGeom prst="rect">
+            <a:avLst/>
+          </a:prstGeom>
+          <a:noFill/>
+        </p:spPr>
+        <p:txBody>
+          <a:bodyPr wrap="none" rtlCol="0">
+            <a:spAutoFit/>
+          </a:bodyPr>
+          <a:lstStyle/>
+          <a:p>
+            <a:r>
+              <a:rPr lang="en-US" dirty="0"/>
+              <a:t>Never miss a written assignment! </a:t>
+            </a:r>
+            <a:br>
+              <a:rPr lang="en-US" dirty="0"/>
+            </a:br>
+            <a:r>
+              <a:rPr lang="en-US" dirty="0"/>
+              <a:t>They affect your grade the most</a:t>
             </a:r>
           </a:p>
         </p:txBody>
@@ -8668,7 +8454,7 @@
           <p:cNvPr id="2" name="Title 1">
             <a:extLst>
               <a:ext uri="{FF2B5EF4-FFF2-40B4-BE49-F238E27FC236}">
-                <a16:creationId xmlns:a16="http://schemas.microsoft.com/office/drawing/2014/main" id="{353C1F7F-7EEA-C941-98E5-5DAAC476A495}"/>
+                <a16:creationId xmlns:a16="http://schemas.microsoft.com/office/drawing/2014/main" id="{4C846D3C-418F-CC4A-8A3F-C11E2CE9B4B4}"/>
               </a:ext>
             </a:extLst>
           </p:cNvPr>
@@ -8686,7 +8472,7 @@
           <a:p>
             <a:r>
               <a:rPr lang="en-US" dirty="0"/>
-              <a:t>Exams</a:t>
+              <a:t>Help Sessions / On-Campus</a:t>
             </a:r>
           </a:p>
         </p:txBody>
@@ -8696,7 +8482,7 @@
           <p:cNvPr id="3" name="Text Placeholder 2">
             <a:extLst>
               <a:ext uri="{FF2B5EF4-FFF2-40B4-BE49-F238E27FC236}">
-                <a16:creationId xmlns:a16="http://schemas.microsoft.com/office/drawing/2014/main" id="{7E1FBF06-F2AB-B040-BBDC-98B3E1F8FAF4}"/>
+                <a16:creationId xmlns:a16="http://schemas.microsoft.com/office/drawing/2014/main" id="{7A290B48-AC40-E94E-A296-113736669564}"/>
               </a:ext>
             </a:extLst>
           </p:cNvPr>
@@ -8709,8 +8495,8 @@
         </p:nvSpPr>
         <p:spPr>
           <a:xfrm>
-            <a:off x="628075" y="1776683"/>
-            <a:ext cx="12561453" cy="3547702"/>
+            <a:off x="628072" y="1463722"/>
+            <a:ext cx="9775099" cy="5668283"/>
           </a:xfrm>
         </p:spPr>
         <p:txBody>
@@ -8719,57 +8505,162 @@
           <a:p>
             <a:r>
               <a:rPr lang="en-US" dirty="0"/>
-              <a:t>End of Unit 1, 3 and Final Exam</a:t>
-            </a:r>
-          </a:p>
-          <a:p>
-            <a:r>
-              <a:rPr lang="en-US" dirty="0"/>
-              <a:t>95 points – exam</a:t>
-            </a:r>
-          </a:p>
-          <a:p>
-            <a:r>
-              <a:rPr lang="en-US" dirty="0"/>
-              <a:t>5 points practice exam (yes, so you should get 100% on the practice exams)</a:t>
-            </a:r>
-          </a:p>
-          <a:p>
-            <a:r>
-              <a:rPr lang="en-US" dirty="0"/>
-              <a:t>All readings up to the exam must be completed</a:t>
+              <a:t>On-Campus Days</a:t>
             </a:r>
           </a:p>
           <a:p>
             <a:pPr lvl="1"/>
             <a:r>
               <a:rPr lang="en-US" dirty="0"/>
-              <a:t>Or you won’t be able to take the exam!</a:t>
+              <a:t>MW, your assigned lab</a:t>
             </a:r>
           </a:p>
           <a:p>
             <a:pPr lvl="1"/>
             <a:r>
               <a:rPr lang="en-US" dirty="0"/>
-              <a:t>You can complete them with a zero, but that is a bad idea</a:t>
-            </a:r>
-          </a:p>
-          <a:p>
-            <a:r>
-              <a:rPr lang="en-US" dirty="0"/>
-              <a:t>We use </a:t>
-            </a:r>
-            <a:r>
-              <a:rPr lang="en-US" dirty="0" err="1"/>
-              <a:t>respondus</a:t>
-            </a:r>
+              <a:t>Tuesday or Thursday – 1 help session a week (like today)</a:t>
+            </a:r>
+          </a:p>
+          <a:p>
+            <a:r>
+              <a:rPr lang="en-US" dirty="0"/>
+              <a:t>Attendance Required?</a:t>
+            </a:r>
+          </a:p>
+          <a:p>
+            <a:pPr lvl="1"/>
+            <a:r>
+              <a:rPr lang="en-US" b="1" dirty="0"/>
+              <a:t>yes!!</a:t>
+            </a:r>
+            <a:r>
+              <a:rPr lang="en-US" dirty="0"/>
+              <a:t>, why?</a:t>
+            </a:r>
+          </a:p>
+          <a:p>
+            <a:pPr lvl="2"/>
+            <a:r>
+              <a:rPr lang="en-US" dirty="0"/>
+              <a:t>This is the discussion element of the course</a:t>
+            </a:r>
+          </a:p>
+          <a:p>
+            <a:pPr lvl="2"/>
+            <a:r>
+              <a:rPr lang="en-US" dirty="0"/>
+              <a:t>If you are sick, that is fine</a:t>
+            </a:r>
+          </a:p>
+          <a:p>
+            <a:pPr lvl="3"/>
+            <a:r>
+              <a:rPr lang="en-US" dirty="0"/>
+              <a:t>we only take a certain number of them, so flexible. </a:t>
+            </a:r>
+          </a:p>
+          <a:p>
+            <a:r>
+              <a:rPr lang="en-US" dirty="0"/>
+              <a:t>Goals of Help Sessions</a:t>
+            </a:r>
+          </a:p>
+          <a:p>
+            <a:pPr lvl="1"/>
+            <a:r>
+              <a:rPr lang="en-US" dirty="0"/>
+              <a:t>Provide content related to lectures and labs (discussion and coding)</a:t>
+            </a:r>
+          </a:p>
+          <a:p>
+            <a:pPr lvl="1"/>
+            <a:r>
+              <a:rPr lang="en-US" dirty="0"/>
+              <a:t>Answer questions</a:t>
+            </a:r>
+          </a:p>
+          <a:p>
+            <a:pPr lvl="1"/>
+            <a:r>
+              <a:rPr lang="en-US" dirty="0"/>
+              <a:t>Build community</a:t>
+            </a:r>
+          </a:p>
+          <a:p>
+            <a:r>
+              <a:rPr lang="en-US" dirty="0"/>
+              <a:t>Your Responsibilities</a:t>
+            </a:r>
+          </a:p>
+          <a:p>
+            <a:pPr lvl="1"/>
+            <a:r>
+              <a:rPr lang="en-US" b="1" dirty="0"/>
+              <a:t>Come with questions</a:t>
+            </a:r>
+            <a:r>
+              <a:rPr lang="en-US" dirty="0"/>
+              <a:t> – mark certain knowledge checks, practice exam questions etc. </a:t>
+            </a:r>
+            <a:endParaRPr lang="en-US" b="1" dirty="0"/>
+          </a:p>
+        </p:txBody>
+      </p:sp>
+      <p:sp>
+        <p:nvSpPr>
+          <p:cNvPr id="4" name="TextBox 3">
+            <a:extLst>
+              <a:ext uri="{FF2B5EF4-FFF2-40B4-BE49-F238E27FC236}">
+                <a16:creationId xmlns:a16="http://schemas.microsoft.com/office/drawing/2014/main" id="{D2260823-25B3-6643-93FD-97CAD9323AA3}"/>
+              </a:ext>
+            </a:extLst>
+          </p:cNvPr>
+          <p:cNvSpPr txBox="1"/>
+          <p:nvPr/>
+        </p:nvSpPr>
+        <p:spPr>
+          <a:xfrm>
+            <a:off x="9024079" y="2316328"/>
+            <a:ext cx="3882452" cy="1938992"/>
+          </a:xfrm>
+          <a:prstGeom prst="rect">
+            <a:avLst/>
+          </a:prstGeom>
+          <a:noFill/>
+        </p:spPr>
+        <p:txBody>
+          <a:bodyPr wrap="square" rtlCol="0">
+            <a:spAutoFit/>
+          </a:bodyPr>
+          <a:lstStyle/>
+          <a:p>
+            <a:r>
+              <a:rPr lang="en-US" b="1" dirty="0"/>
+              <a:t>Pro Tip:</a:t>
+            </a:r>
+          </a:p>
+          <a:p>
+            <a:r>
+              <a:rPr lang="en-US" dirty="0"/>
+              <a:t>Send questions to your TA </a:t>
+            </a:r>
+            <a:r>
+              <a:rPr lang="en-US" i="1" dirty="0"/>
+              <a:t>before</a:t>
+            </a:r>
+            <a:r>
+              <a:rPr lang="en-US" dirty="0"/>
+              <a:t> the help session. </a:t>
+            </a:r>
+          </a:p>
+          <a:p>
             <a:endParaRPr lang="en-US" dirty="0"/>
           </a:p>
           <a:p>
-            <a:pPr lvl="1"/>
-            <a:r>
-              <a:rPr lang="en-US" dirty="0"/>
-              <a:t>Which is why the syllabus quiz requires it – just to make sure you are ready for the exam in four weeks</a:t>
+            <a:r>
+              <a:rPr lang="en-US" dirty="0"/>
+              <a:t>Ask them to cover them during the help session.</a:t>
             </a:r>
           </a:p>
         </p:txBody>
@@ -8777,7 +8668,7 @@
     </p:spTree>
     <p:extLst>
       <p:ext uri="{BB962C8B-B14F-4D97-AF65-F5344CB8AC3E}">
-        <p14:creationId xmlns:p14="http://schemas.microsoft.com/office/powerpoint/2010/main" val="2448334619"/>
+        <p14:creationId xmlns:p14="http://schemas.microsoft.com/office/powerpoint/2010/main" val="451251514"/>
       </p:ext>
     </p:extLst>
   </p:cSld>
@@ -8821,7 +8712,7 @@
           <p:cNvPr id="2" name="Title 1">
             <a:extLst>
               <a:ext uri="{FF2B5EF4-FFF2-40B4-BE49-F238E27FC236}">
-                <a16:creationId xmlns:a16="http://schemas.microsoft.com/office/drawing/2014/main" id="{4C846D3C-418F-CC4A-8A3F-C11E2CE9B4B4}"/>
+                <a16:creationId xmlns:a16="http://schemas.microsoft.com/office/drawing/2014/main" id="{6302E6FC-80C8-2F4C-A9F0-9B205434775A}"/>
               </a:ext>
             </a:extLst>
           </p:cNvPr>
@@ -8839,7 +8730,7 @@
           <a:p>
             <a:r>
               <a:rPr lang="en-US" dirty="0"/>
-              <a:t>Help Sessions / On-Campus</a:t>
+              <a:t>Coding is Like Music</a:t>
             </a:r>
           </a:p>
         </p:txBody>
@@ -8849,7 +8740,7 @@
           <p:cNvPr id="3" name="Text Placeholder 2">
             <a:extLst>
               <a:ext uri="{FF2B5EF4-FFF2-40B4-BE49-F238E27FC236}">
-                <a16:creationId xmlns:a16="http://schemas.microsoft.com/office/drawing/2014/main" id="{7A290B48-AC40-E94E-A296-113736669564}"/>
+                <a16:creationId xmlns:a16="http://schemas.microsoft.com/office/drawing/2014/main" id="{93E01694-2C32-BA4D-B6F8-4BE99716E841}"/>
               </a:ext>
             </a:extLst>
           </p:cNvPr>
@@ -8862,8 +8753,8 @@
         </p:nvSpPr>
         <p:spPr>
           <a:xfrm>
-            <a:off x="628072" y="1463722"/>
-            <a:ext cx="9775099" cy="5668283"/>
+            <a:off x="628075" y="1776683"/>
+            <a:ext cx="12561453" cy="4323299"/>
           </a:xfrm>
         </p:spPr>
         <p:txBody>
@@ -8872,163 +8763,88 @@
           <a:p>
             <a:r>
               <a:rPr lang="en-US" dirty="0"/>
-              <a:t>On-Campus Days</a:t>
+              <a:t>To be successful in CS 150</a:t>
             </a:r>
           </a:p>
           <a:p>
             <a:pPr lvl="1"/>
             <a:r>
               <a:rPr lang="en-US" dirty="0"/>
-              <a:t>MW, your assigned lab</a:t>
+              <a:t>Work ahead of the schedule</a:t>
+            </a:r>
+          </a:p>
+          <a:p>
+            <a:pPr lvl="2"/>
+            <a:r>
+              <a:rPr lang="en-US" dirty="0"/>
+              <a:t>Go through the modules</a:t>
+            </a:r>
+          </a:p>
+          <a:p>
+            <a:pPr lvl="2"/>
+            <a:r>
+              <a:rPr lang="en-US" dirty="0"/>
+              <a:t>Try the lab before going to the lab day! </a:t>
             </a:r>
           </a:p>
           <a:p>
             <a:pPr lvl="1"/>
             <a:r>
               <a:rPr lang="en-US" dirty="0"/>
-              <a:t>Tuesday or Thursday – 1 help session a week (like today)</a:t>
-            </a:r>
-          </a:p>
-          <a:p>
-            <a:r>
-              <a:rPr lang="en-US" dirty="0"/>
-              <a:t>Attendance Required?</a:t>
+              <a:t>Practice often (</a:t>
+            </a:r>
+            <a:r>
+              <a:rPr lang="en-US" b="1" dirty="0"/>
+              <a:t>daily</a:t>
+            </a:r>
+            <a:r>
+              <a:rPr lang="en-US" dirty="0"/>
+              <a:t>)</a:t>
             </a:r>
           </a:p>
           <a:p>
             <a:pPr lvl="1"/>
             <a:r>
               <a:rPr lang="en-US" dirty="0"/>
-              <a:t>No, but…</a:t>
+              <a:t>Get help when you are stuck</a:t>
             </a:r>
           </a:p>
           <a:p>
             <a:pPr lvl="1"/>
             <a:r>
               <a:rPr lang="en-US" dirty="0"/>
-              <a:t>Really, really good idea. </a:t>
+              <a:t>Keep practicing</a:t>
+            </a:r>
+          </a:p>
+          <a:p>
+            <a:r>
+              <a:rPr lang="en-US" dirty="0"/>
+              <a:t>Memorization</a:t>
             </a:r>
           </a:p>
           <a:p>
             <a:pPr lvl="1"/>
             <a:r>
               <a:rPr lang="en-US" dirty="0"/>
-              <a:t>We give extra credit per help session you attend</a:t>
+              <a:t>Won’t help you! (maybe on culture topics)</a:t>
             </a:r>
           </a:p>
           <a:p>
             <a:pPr lvl="1"/>
             <a:r>
               <a:rPr lang="en-US" dirty="0"/>
-              <a:t>REPLACES the 2:00-2:50 T/TH time in </a:t>
-            </a:r>
-            <a:r>
-              <a:rPr lang="en-US" dirty="0" err="1"/>
-              <a:t>ramweb</a:t>
-            </a:r>
-            <a:endParaRPr lang="en-US" dirty="0"/>
-          </a:p>
-          <a:p>
-            <a:r>
-              <a:rPr lang="en-US" dirty="0"/>
-              <a:t>Goals of Help Sessions</a:t>
-            </a:r>
-          </a:p>
-          <a:p>
-            <a:pPr lvl="1"/>
-            <a:r>
-              <a:rPr lang="en-US" dirty="0"/>
-              <a:t>Provide content related to lectures and labs (discussion and coding)</a:t>
-            </a:r>
-          </a:p>
-          <a:p>
-            <a:pPr lvl="1"/>
-            <a:r>
-              <a:rPr lang="en-US" dirty="0"/>
-              <a:t>Answer questions</a:t>
-            </a:r>
-          </a:p>
-          <a:p>
-            <a:pPr lvl="1"/>
-            <a:r>
-              <a:rPr lang="en-US" dirty="0"/>
-              <a:t>Build community</a:t>
-            </a:r>
-          </a:p>
-          <a:p>
-            <a:r>
-              <a:rPr lang="en-US" dirty="0"/>
-              <a:t>Your Responsibilities</a:t>
-            </a:r>
-          </a:p>
-          <a:p>
-            <a:pPr lvl="1"/>
+              <a:t>You can’t memorize problem solving</a:t>
+            </a:r>
+          </a:p>
+          <a:p>
+            <a:pPr lvl="2"/>
+            <a:r>
+              <a:rPr lang="en-US" dirty="0"/>
+              <a:t>You have to practice </a:t>
+            </a:r>
             <a:r>
               <a:rPr lang="en-US" b="1" dirty="0"/>
-              <a:t>Come with questions</a:t>
-            </a:r>
-            <a:r>
-              <a:rPr lang="en-US" dirty="0"/>
-              <a:t> – mark certain knowledge checks, practice exam questions etc. </a:t>
-            </a:r>
-            <a:endParaRPr lang="en-US" b="1" dirty="0"/>
-          </a:p>
-        </p:txBody>
-      </p:sp>
-      <p:sp>
-        <p:nvSpPr>
-          <p:cNvPr id="4" name="TextBox 3">
-            <a:extLst>
-              <a:ext uri="{FF2B5EF4-FFF2-40B4-BE49-F238E27FC236}">
-                <a16:creationId xmlns:a16="http://schemas.microsoft.com/office/drawing/2014/main" id="{D2260823-25B3-6643-93FD-97CAD9323AA3}"/>
-              </a:ext>
-            </a:extLst>
-          </p:cNvPr>
-          <p:cNvSpPr txBox="1"/>
-          <p:nvPr/>
-        </p:nvSpPr>
-        <p:spPr>
-          <a:xfrm>
-            <a:off x="9024079" y="2316328"/>
-            <a:ext cx="3882452" cy="1938992"/>
-          </a:xfrm>
-          <a:prstGeom prst="rect">
-            <a:avLst/>
-          </a:prstGeom>
-          <a:noFill/>
-        </p:spPr>
-        <p:txBody>
-          <a:bodyPr wrap="square" rtlCol="0">
-            <a:spAutoFit/>
-          </a:bodyPr>
-          <a:lstStyle/>
-          <a:p>
-            <a:r>
-              <a:rPr lang="en-US" b="1" dirty="0"/>
-              <a:t>Pro Tip:</a:t>
-            </a:r>
-          </a:p>
-          <a:p>
-            <a:r>
-              <a:rPr lang="en-US" dirty="0"/>
-              <a:t>Send questions to your TA </a:t>
-            </a:r>
-            <a:r>
-              <a:rPr lang="en-US" i="1" dirty="0"/>
-              <a:t>before</a:t>
-            </a:r>
-            <a:r>
-              <a:rPr lang="en-US" dirty="0"/>
-              <a:t> the help session. </a:t>
-            </a:r>
-          </a:p>
-          <a:p>
-            <a:endParaRPr lang="en-US" dirty="0"/>
-          </a:p>
-          <a:p>
-            <a:r>
-              <a:rPr lang="en-US" dirty="0"/>
-              <a:t>Ask them to cover them during the help session.</a:t>
+              <a:t>Divide-Conquer-Glue</a:t>
             </a:r>
           </a:p>
         </p:txBody>
@@ -9036,7 +8852,7 @@
     </p:spTree>
     <p:extLst>
       <p:ext uri="{BB962C8B-B14F-4D97-AF65-F5344CB8AC3E}">
-        <p14:creationId xmlns:p14="http://schemas.microsoft.com/office/powerpoint/2010/main" val="451251514"/>
+        <p14:creationId xmlns:p14="http://schemas.microsoft.com/office/powerpoint/2010/main" val="2945212090"/>
       </p:ext>
     </p:extLst>
   </p:cSld>

</xml_diff>